<commit_message>
finishing touches and notes
</commit_message>
<xml_diff>
--- a/California Renewable Energy.pptx
+++ b/California Renewable Energy.pptx
@@ -160,6 +160,9 @@
     <p:ext uri="{EFAFB233-063F-42B5-8137-9DF3F51BA10A}">
       <p15:sldGuideLst xmlns:p15="http://schemas.microsoft.com/office/powerpoint/2012/main"/>
     </p:ext>
+    <p:ext uri="{2D200454-40CA-4A62-9FC3-DE9A4176ACB9}">
+      <p15:notesGuideLst xmlns:p15="http://schemas.microsoft.com/office/powerpoint/2012/main"/>
+    </p:ext>
   </p:extLst>
 </p:presentation>
 </file>
@@ -177,7 +180,7 @@
   <pc:docChgLst>
     <pc:chgData name="Abraham Huitron" userId="c8a9401c965bdcdd" providerId="LiveId" clId="{464B1625-D5C2-4D51-A609-440C8C188059}"/>
     <pc:docChg chg="undo custSel addSld delSld modSld sldOrd modSection">
-      <pc:chgData name="Abraham Huitron" userId="c8a9401c965bdcdd" providerId="LiveId" clId="{464B1625-D5C2-4D51-A609-440C8C188059}" dt="2022-08-02T07:34:06.529" v="5570" actId="47"/>
+      <pc:chgData name="Abraham Huitron" userId="c8a9401c965bdcdd" providerId="LiveId" clId="{464B1625-D5C2-4D51-A609-440C8C188059}" dt="2022-08-03T02:22:12.614" v="5572" actId="114"/>
       <pc:docMkLst>
         <pc:docMk/>
       </pc:docMkLst>
@@ -233,6 +236,21 @@
             <ac:graphicFrameMk id="5" creationId="{F90868F7-8E72-ABAB-76E2-E049B1DF2D02}"/>
           </ac:graphicFrameMkLst>
         </pc:graphicFrameChg>
+      </pc:sldChg>
+      <pc:sldChg chg="modSp mod">
+        <pc:chgData name="Abraham Huitron" userId="c8a9401c965bdcdd" providerId="LiveId" clId="{464B1625-D5C2-4D51-A609-440C8C188059}" dt="2022-08-03T02:14:58.380" v="5571" actId="114"/>
+        <pc:sldMkLst>
+          <pc:docMk/>
+          <pc:sldMk cId="1710912309" sldId="260"/>
+        </pc:sldMkLst>
+        <pc:spChg chg="mod">
+          <ac:chgData name="Abraham Huitron" userId="c8a9401c965bdcdd" providerId="LiveId" clId="{464B1625-D5C2-4D51-A609-440C8C188059}" dt="2022-08-03T02:14:58.380" v="5571" actId="114"/>
+          <ac:spMkLst>
+            <pc:docMk/>
+            <pc:sldMk cId="1710912309" sldId="260"/>
+            <ac:spMk id="3" creationId="{B4C5A72D-6DAB-9E67-63FB-F59AB871AFD6}"/>
+          </ac:spMkLst>
+        </pc:spChg>
       </pc:sldChg>
       <pc:sldChg chg="modSp del mod">
         <pc:chgData name="Abraham Huitron" userId="c8a9401c965bdcdd" providerId="LiveId" clId="{464B1625-D5C2-4D51-A609-440C8C188059}" dt="2022-08-02T01:37:42.957" v="2456" actId="47"/>
@@ -907,7 +925,7 @@
         </pc:sldMkLst>
       </pc:sldChg>
       <pc:sldChg chg="addSp modSp add mod modNotesTx">
-        <pc:chgData name="Abraham Huitron" userId="c8a9401c965bdcdd" providerId="LiveId" clId="{464B1625-D5C2-4D51-A609-440C8C188059}" dt="2022-08-02T07:32:41.910" v="5551" actId="20577"/>
+        <pc:chgData name="Abraham Huitron" userId="c8a9401c965bdcdd" providerId="LiveId" clId="{464B1625-D5C2-4D51-A609-440C8C188059}" dt="2022-08-03T02:22:12.614" v="5572" actId="114"/>
         <pc:sldMkLst>
           <pc:docMk/>
           <pc:sldMk cId="1935583552" sldId="284"/>
@@ -921,7 +939,7 @@
           </ac:spMkLst>
         </pc:spChg>
         <pc:spChg chg="add mod">
-          <ac:chgData name="Abraham Huitron" userId="c8a9401c965bdcdd" providerId="LiveId" clId="{464B1625-D5C2-4D51-A609-440C8C188059}" dt="2022-08-02T07:32:41.910" v="5551" actId="20577"/>
+          <ac:chgData name="Abraham Huitron" userId="c8a9401c965bdcdd" providerId="LiveId" clId="{464B1625-D5C2-4D51-A609-440C8C188059}" dt="2022-08-03T02:22:12.614" v="5572" actId="114"/>
           <ac:spMkLst>
             <pc:docMk/>
             <pc:sldMk cId="1935583552" sldId="284"/>
@@ -1039,7 +1057,7 @@
           <a:p>
             <a:fld id="{1D965A04-9493-4222-8655-597A5A09B975}" type="datetimeFigureOut">
               <a:rPr lang="en-US" smtClean="0"/>
-              <a:t>8/1/2022</a:t>
+              <a:t>8/2/2022</a:t>
             </a:fld>
             <a:endParaRPr lang="en-US"/>
           </a:p>
@@ -3744,7 +3762,7 @@
           <a:p>
             <a:fld id="{582340CD-6BDE-4EA9-96A0-89C60E7ECEFC}" type="datetimeFigureOut">
               <a:rPr lang="en-US" smtClean="0"/>
-              <a:t>8/1/2022</a:t>
+              <a:t>8/2/2022</a:t>
             </a:fld>
             <a:endParaRPr lang="en-US"/>
           </a:p>
@@ -3995,7 +4013,7 @@
           <a:p>
             <a:fld id="{582340CD-6BDE-4EA9-96A0-89C60E7ECEFC}" type="datetimeFigureOut">
               <a:rPr lang="en-US" smtClean="0"/>
-              <a:t>8/1/2022</a:t>
+              <a:t>8/2/2022</a:t>
             </a:fld>
             <a:endParaRPr lang="en-US"/>
           </a:p>
@@ -4309,7 +4327,7 @@
           <a:p>
             <a:fld id="{582340CD-6BDE-4EA9-96A0-89C60E7ECEFC}" type="datetimeFigureOut">
               <a:rPr lang="en-US" smtClean="0"/>
-              <a:t>8/1/2022</a:t>
+              <a:t>8/2/2022</a:t>
             </a:fld>
             <a:endParaRPr lang="en-US"/>
           </a:p>
@@ -4650,7 +4668,7 @@
           <a:p>
             <a:fld id="{582340CD-6BDE-4EA9-96A0-89C60E7ECEFC}" type="datetimeFigureOut">
               <a:rPr lang="en-US" smtClean="0"/>
-              <a:t>8/1/2022</a:t>
+              <a:t>8/2/2022</a:t>
             </a:fld>
             <a:endParaRPr lang="en-US"/>
           </a:p>
@@ -4964,7 +4982,7 @@
           <a:p>
             <a:fld id="{582340CD-6BDE-4EA9-96A0-89C60E7ECEFC}" type="datetimeFigureOut">
               <a:rPr lang="en-US" smtClean="0"/>
-              <a:t>8/1/2022</a:t>
+              <a:t>8/2/2022</a:t>
             </a:fld>
             <a:endParaRPr lang="en-US"/>
           </a:p>
@@ -5357,7 +5375,7 @@
           <a:p>
             <a:fld id="{582340CD-6BDE-4EA9-96A0-89C60E7ECEFC}" type="datetimeFigureOut">
               <a:rPr lang="en-US" smtClean="0"/>
-              <a:t>8/1/2022</a:t>
+              <a:t>8/2/2022</a:t>
             </a:fld>
             <a:endParaRPr lang="en-US"/>
           </a:p>
@@ -5527,7 +5545,7 @@
           <a:p>
             <a:fld id="{582340CD-6BDE-4EA9-96A0-89C60E7ECEFC}" type="datetimeFigureOut">
               <a:rPr lang="en-US" smtClean="0"/>
-              <a:t>8/1/2022</a:t>
+              <a:t>8/2/2022</a:t>
             </a:fld>
             <a:endParaRPr lang="en-US"/>
           </a:p>
@@ -5707,7 +5725,7 @@
           <a:p>
             <a:fld id="{582340CD-6BDE-4EA9-96A0-89C60E7ECEFC}" type="datetimeFigureOut">
               <a:rPr lang="en-US" smtClean="0"/>
-              <a:t>8/1/2022</a:t>
+              <a:t>8/2/2022</a:t>
             </a:fld>
             <a:endParaRPr lang="en-US"/>
           </a:p>
@@ -5883,7 +5901,7 @@
           <a:p>
             <a:fld id="{582340CD-6BDE-4EA9-96A0-89C60E7ECEFC}" type="datetimeFigureOut">
               <a:rPr lang="en-US" smtClean="0"/>
-              <a:t>8/1/2022</a:t>
+              <a:t>8/2/2022</a:t>
             </a:fld>
             <a:endParaRPr lang="en-US"/>
           </a:p>
@@ -6130,7 +6148,7 @@
           <a:p>
             <a:fld id="{582340CD-6BDE-4EA9-96A0-89C60E7ECEFC}" type="datetimeFigureOut">
               <a:rPr lang="en-US" smtClean="0"/>
-              <a:t>8/1/2022</a:t>
+              <a:t>8/2/2022</a:t>
             </a:fld>
             <a:endParaRPr lang="en-US"/>
           </a:p>
@@ -6362,7 +6380,7 @@
           <a:p>
             <a:fld id="{582340CD-6BDE-4EA9-96A0-89C60E7ECEFC}" type="datetimeFigureOut">
               <a:rPr lang="en-US" smtClean="0"/>
-              <a:t>8/1/2022</a:t>
+              <a:t>8/2/2022</a:t>
             </a:fld>
             <a:endParaRPr lang="en-US"/>
           </a:p>
@@ -6736,7 +6754,7 @@
           <a:p>
             <a:fld id="{582340CD-6BDE-4EA9-96A0-89C60E7ECEFC}" type="datetimeFigureOut">
               <a:rPr lang="en-US" smtClean="0"/>
-              <a:t>8/1/2022</a:t>
+              <a:t>8/2/2022</a:t>
             </a:fld>
             <a:endParaRPr lang="en-US"/>
           </a:p>
@@ -6859,7 +6877,7 @@
           <a:p>
             <a:fld id="{582340CD-6BDE-4EA9-96A0-89C60E7ECEFC}" type="datetimeFigureOut">
               <a:rPr lang="en-US" smtClean="0"/>
-              <a:t>8/1/2022</a:t>
+              <a:t>8/2/2022</a:t>
             </a:fld>
             <a:endParaRPr lang="en-US"/>
           </a:p>
@@ -6954,7 +6972,7 @@
           <a:p>
             <a:fld id="{582340CD-6BDE-4EA9-96A0-89C60E7ECEFC}" type="datetimeFigureOut">
               <a:rPr lang="en-US" smtClean="0"/>
-              <a:t>8/1/2022</a:t>
+              <a:t>8/2/2022</a:t>
             </a:fld>
             <a:endParaRPr lang="en-US"/>
           </a:p>
@@ -7209,7 +7227,7 @@
           <a:p>
             <a:fld id="{582340CD-6BDE-4EA9-96A0-89C60E7ECEFC}" type="datetimeFigureOut">
               <a:rPr lang="en-US" smtClean="0"/>
-              <a:t>8/1/2022</a:t>
+              <a:t>8/2/2022</a:t>
             </a:fld>
             <a:endParaRPr lang="en-US"/>
           </a:p>
@@ -7472,7 +7490,7 @@
           <a:p>
             <a:fld id="{582340CD-6BDE-4EA9-96A0-89C60E7ECEFC}" type="datetimeFigureOut">
               <a:rPr lang="en-US" smtClean="0"/>
-              <a:t>8/1/2022</a:t>
+              <a:t>8/2/2022</a:t>
             </a:fld>
             <a:endParaRPr lang="en-US"/>
           </a:p>
@@ -8215,7 +8233,7 @@
           <a:p>
             <a:fld id="{582340CD-6BDE-4EA9-96A0-89C60E7ECEFC}" type="datetimeFigureOut">
               <a:rPr lang="en-US" smtClean="0"/>
-              <a:t>8/1/2022</a:t>
+              <a:t>8/2/2022</a:t>
             </a:fld>
             <a:endParaRPr lang="en-US"/>
           </a:p>
@@ -11289,56 +11307,56 @@
           <a:lstStyle/>
           <a:p>
             <a:r>
-              <a:rPr lang="en-US" sz="2000" i="1" dirty="0"/>
+              <a:rPr lang="en-US" sz="2000" dirty="0"/>
               <a:t>Can we utilize the seasonality of the production methods in order to maximize energy production efficiently?</a:t>
             </a:r>
           </a:p>
           <a:p>
             <a:r>
-              <a:rPr lang="en-US" sz="2000" i="1" dirty="0"/>
+              <a:rPr lang="en-US" sz="2000" dirty="0"/>
               <a:t>With further research, could we analyze which technologies are better to pursue in the future?</a:t>
             </a:r>
           </a:p>
           <a:p>
             <a:r>
-              <a:rPr lang="en-US" sz="2000" i="1" dirty="0"/>
+              <a:rPr lang="en-US" sz="2000" dirty="0"/>
               <a:t>Is it cheaper to produce one form of energy over another? Is it also easier? </a:t>
             </a:r>
           </a:p>
           <a:p>
             <a:r>
-              <a:rPr lang="en-US" sz="2000" i="1" dirty="0"/>
+              <a:rPr lang="en-US" sz="2000" dirty="0"/>
               <a:t>Can we further predict the growth of adoption/popularity of current or newer technology?</a:t>
             </a:r>
           </a:p>
           <a:p>
             <a:r>
-              <a:rPr lang="en-US" sz="2000" i="1" dirty="0"/>
+              <a:rPr lang="en-US" sz="2000" dirty="0"/>
               <a:t>Is one technology limited in its daily production than others?</a:t>
             </a:r>
           </a:p>
           <a:p>
             <a:r>
-              <a:rPr lang="en-US" sz="2000" i="1" dirty="0"/>
+              <a:rPr lang="en-US" sz="2000" dirty="0"/>
               <a:t>Can we get more data to analyze more forms even deeper?</a:t>
             </a:r>
           </a:p>
           <a:p>
             <a:pPr lvl="1"/>
             <a:r>
-              <a:rPr lang="en-US" sz="1800" i="1" dirty="0"/>
+              <a:rPr lang="en-US" sz="1800" dirty="0"/>
               <a:t>How can we handle missing values?</a:t>
             </a:r>
           </a:p>
           <a:p>
             <a:pPr lvl="1"/>
             <a:r>
-              <a:rPr lang="en-US" sz="1800" i="1" dirty="0"/>
+              <a:rPr lang="en-US" sz="1800" dirty="0"/>
               <a:t>Investigate missing values</a:t>
             </a:r>
           </a:p>
           <a:p>
-            <a:endParaRPr lang="en-US" sz="2000" i="1" dirty="0"/>
+            <a:endParaRPr lang="en-US" sz="2000" dirty="0"/>
           </a:p>
         </p:txBody>
       </p:sp>
@@ -13303,70 +13321,70 @@
           <a:lstStyle/>
           <a:p>
             <a:r>
-              <a:rPr lang="en-US" sz="2000" i="1" dirty="0"/>
+              <a:rPr lang="en-US" sz="2000" dirty="0"/>
               <a:t>What can this data tell us about the production of renewable energy over the given period?</a:t>
             </a:r>
           </a:p>
           <a:p>
             <a:pPr lvl="1"/>
             <a:r>
-              <a:rPr lang="en-US" sz="1800" i="1" dirty="0"/>
+              <a:rPr lang="en-US" sz="1800" dirty="0"/>
               <a:t>Is there seasonality? Is it daily? Monthly? Yearly?</a:t>
             </a:r>
             <a:br>
-              <a:rPr lang="en-US" sz="1800" i="1" dirty="0"/>
+              <a:rPr lang="en-US" sz="1800" dirty="0"/>
             </a:br>
-            <a:endParaRPr lang="en-US" sz="1800" i="1" dirty="0"/>
-          </a:p>
-          <a:p>
-            <a:r>
-              <a:rPr lang="en-US" sz="2000" i="1" dirty="0"/>
+            <a:endParaRPr lang="en-US" sz="1800" dirty="0"/>
+          </a:p>
+          <a:p>
+            <a:r>
+              <a:rPr lang="en-US" sz="2000" dirty="0"/>
               <a:t>Which methods of energy generation are used most?</a:t>
             </a:r>
           </a:p>
           <a:p>
             <a:pPr lvl="1"/>
             <a:r>
-              <a:rPr lang="en-US" sz="1800" i="1" dirty="0"/>
+              <a:rPr lang="en-US" sz="1800" dirty="0"/>
               <a:t>Different methods generate at different speeds.</a:t>
             </a:r>
             <a:br>
-              <a:rPr lang="en-US" sz="1800" i="1" dirty="0"/>
+              <a:rPr lang="en-US" sz="1800" dirty="0"/>
             </a:br>
-            <a:endParaRPr lang="en-US" sz="1800" i="1" dirty="0"/>
-          </a:p>
-          <a:p>
-            <a:r>
-              <a:rPr lang="en-US" sz="2000" i="1" dirty="0"/>
+            <a:endParaRPr lang="en-US" sz="1800" dirty="0"/>
+          </a:p>
+          <a:p>
+            <a:r>
+              <a:rPr lang="en-US" sz="2000" dirty="0"/>
               <a:t>Which methods appear to be growing vs. declining? Why?</a:t>
             </a:r>
           </a:p>
           <a:p>
             <a:pPr lvl="1"/>
             <a:r>
-              <a:rPr lang="en-US" sz="1800" i="1" dirty="0"/>
+              <a:rPr lang="en-US" sz="1800" dirty="0"/>
               <a:t>More adoption? Cheaper operating costs? </a:t>
             </a:r>
             <a:br>
-              <a:rPr lang="en-US" sz="1800" i="1" dirty="0"/>
+              <a:rPr lang="en-US" sz="1800" dirty="0"/>
             </a:br>
-            <a:endParaRPr lang="en-US" sz="1800" i="1" dirty="0"/>
-          </a:p>
-          <a:p>
-            <a:r>
-              <a:rPr lang="en-US" sz="2000" i="1" dirty="0"/>
+            <a:endParaRPr lang="en-US" sz="1800" dirty="0"/>
+          </a:p>
+          <a:p>
+            <a:r>
+              <a:rPr lang="en-US" sz="2000" dirty="0"/>
               <a:t>Can we predict/forecast the values of future time periods? </a:t>
             </a:r>
           </a:p>
           <a:p>
             <a:pPr lvl="1"/>
             <a:r>
-              <a:rPr lang="en-US" sz="1800" i="1" dirty="0"/>
+              <a:rPr lang="en-US" sz="1800" dirty="0"/>
               <a:t>Why would we want to know this value?</a:t>
             </a:r>
           </a:p>
           <a:p>
-            <a:endParaRPr lang="en-US" sz="2000" i="1" dirty="0"/>
+            <a:endParaRPr lang="en-US" sz="2000" dirty="0"/>
           </a:p>
         </p:txBody>
       </p:sp>

</xml_diff>